<commit_message>
Aprobacion de cambios Julian Aguilar
</commit_message>
<xml_diff>
--- a/tarea/Diagrama de Pareto.pptx
+++ b/tarea/Diagrama de Pareto.pptx
@@ -7,11 +7,13 @@
   <p:sldIdLst>
     <p:sldId id="256" r:id="rId2"/>
     <p:sldId id="257" r:id="rId3"/>
-    <p:sldId id="262" r:id="rId4"/>
-    <p:sldId id="258" r:id="rId5"/>
-    <p:sldId id="259" r:id="rId6"/>
-    <p:sldId id="260" r:id="rId7"/>
-    <p:sldId id="261" r:id="rId8"/>
+    <p:sldId id="258" r:id="rId4"/>
+    <p:sldId id="259" r:id="rId5"/>
+    <p:sldId id="262" r:id="rId6"/>
+    <p:sldId id="263" r:id="rId7"/>
+    <p:sldId id="264" r:id="rId8"/>
+    <p:sldId id="260" r:id="rId9"/>
+    <p:sldId id="261" r:id="rId10"/>
   </p:sldIdLst>
   <p:sldSz cx="9144000" cy="6858000" type="screen4x3"/>
   <p:notesSz cx="6858000" cy="9144000"/>
@@ -110,6 +112,22 @@
       </a:defRPr>
     </a:lvl9pPr>
   </p:defaultTextStyle>
+  <p:extLst>
+    <p:ext uri="{EFAFB233-063F-42B5-8137-9DF3F51BA10A}">
+      <p15:sldGuideLst xmlns:p15="http://schemas.microsoft.com/office/powerpoint/2012/main">
+        <p15:guide id="1" orient="horz" pos="2160">
+          <p15:clr>
+            <a:srgbClr val="A4A3A4"/>
+          </p15:clr>
+        </p15:guide>
+        <p15:guide id="2" pos="2880">
+          <p15:clr>
+            <a:srgbClr val="A4A3A4"/>
+          </p15:clr>
+        </p15:guide>
+      </p15:sldGuideLst>
+    </p:ext>
+  </p:extLst>
 </p:presentation>
 </file>
 
@@ -393,7 +411,7 @@
           <a:p>
             <a:fld id="{16DB4BCF-0BF3-4385-8ABA-E98DB5C1E267}" type="datetimeFigureOut">
               <a:rPr lang="es-MX" smtClean="0"/>
-              <a:t>17/04/2015</a:t>
+              <a:t>21/04/2015</a:t>
             </a:fld>
             <a:endParaRPr lang="es-MX"/>
           </a:p>
@@ -786,7 +804,7 @@
           <a:p>
             <a:fld id="{16DB4BCF-0BF3-4385-8ABA-E98DB5C1E267}" type="datetimeFigureOut">
               <a:rPr lang="es-MX" smtClean="0"/>
-              <a:t>17/04/2015</a:t>
+              <a:t>21/04/2015</a:t>
             </a:fld>
             <a:endParaRPr lang="es-MX"/>
           </a:p>
@@ -1318,7 +1336,7 @@
           <a:p>
             <a:fld id="{16DB4BCF-0BF3-4385-8ABA-E98DB5C1E267}" type="datetimeFigureOut">
               <a:rPr lang="es-MX" smtClean="0"/>
-              <a:t>17/04/2015</a:t>
+              <a:t>21/04/2015</a:t>
             </a:fld>
             <a:endParaRPr lang="es-MX"/>
           </a:p>
@@ -1451,7 +1469,7 @@
           <a:p>
             <a:fld id="{16DB4BCF-0BF3-4385-8ABA-E98DB5C1E267}" type="datetimeFigureOut">
               <a:rPr lang="es-MX" smtClean="0"/>
-              <a:t>17/04/2015</a:t>
+              <a:t>21/04/2015</a:t>
             </a:fld>
             <a:endParaRPr lang="es-MX"/>
           </a:p>
@@ -1994,7 +2012,7 @@
           <a:p>
             <a:fld id="{16DB4BCF-0BF3-4385-8ABA-E98DB5C1E267}" type="datetimeFigureOut">
               <a:rPr lang="es-MX" smtClean="0"/>
-              <a:t>17/04/2015</a:t>
+              <a:t>21/04/2015</a:t>
             </a:fld>
             <a:endParaRPr lang="es-MX"/>
           </a:p>
@@ -2289,7 +2307,7 @@
           <a:p>
             <a:fld id="{16DB4BCF-0BF3-4385-8ABA-E98DB5C1E267}" type="datetimeFigureOut">
               <a:rPr lang="es-MX" smtClean="0"/>
-              <a:t>17/04/2015</a:t>
+              <a:t>21/04/2015</a:t>
             </a:fld>
             <a:endParaRPr lang="es-MX"/>
           </a:p>
@@ -2948,7 +2966,7 @@
           <a:p>
             <a:fld id="{16DB4BCF-0BF3-4385-8ABA-E98DB5C1E267}" type="datetimeFigureOut">
               <a:rPr lang="es-MX" smtClean="0"/>
-              <a:t>17/04/2015</a:t>
+              <a:t>21/04/2015</a:t>
             </a:fld>
             <a:endParaRPr lang="es-MX"/>
           </a:p>
@@ -3384,7 +3402,7 @@
           <a:p>
             <a:fld id="{16DB4BCF-0BF3-4385-8ABA-E98DB5C1E267}" type="datetimeFigureOut">
               <a:rPr lang="es-MX" smtClean="0"/>
-              <a:t>17/04/2015</a:t>
+              <a:t>21/04/2015</a:t>
             </a:fld>
             <a:endParaRPr lang="es-MX"/>
           </a:p>
@@ -3697,7 +3715,7 @@
           <a:p>
             <a:fld id="{16DB4BCF-0BF3-4385-8ABA-E98DB5C1E267}" type="datetimeFigureOut">
               <a:rPr lang="es-MX" smtClean="0"/>
-              <a:t>17/04/2015</a:t>
+              <a:t>21/04/2015</a:t>
             </a:fld>
             <a:endParaRPr lang="es-MX"/>
           </a:p>
@@ -4429,7 +4447,7 @@
           <a:p>
             <a:fld id="{16DB4BCF-0BF3-4385-8ABA-E98DB5C1E267}" type="datetimeFigureOut">
               <a:rPr lang="es-MX" smtClean="0"/>
-              <a:t>17/04/2015</a:t>
+              <a:t>21/04/2015</a:t>
             </a:fld>
             <a:endParaRPr lang="es-MX"/>
           </a:p>
@@ -5093,7 +5111,7 @@
           <a:p>
             <a:fld id="{16DB4BCF-0BF3-4385-8ABA-E98DB5C1E267}" type="datetimeFigureOut">
               <a:rPr lang="es-MX" smtClean="0"/>
-              <a:t>17/04/2015</a:t>
+              <a:t>21/04/2015</a:t>
             </a:fld>
             <a:endParaRPr lang="es-MX"/>
           </a:p>
@@ -5366,7 +5384,7 @@
           <a:p>
             <a:fld id="{16DB4BCF-0BF3-4385-8ABA-E98DB5C1E267}" type="datetimeFigureOut">
               <a:rPr lang="es-MX" smtClean="0"/>
-              <a:t>17/04/2015</a:t>
+              <a:t>21/04/2015</a:t>
             </a:fld>
             <a:endParaRPr lang="es-MX"/>
           </a:p>
@@ -6314,7 +6332,7 @@
           <a:p>
             <a:r>
               <a:rPr lang="es-MX" dirty="0" smtClean="0"/>
-              <a:t>Usos </a:t>
+              <a:t>Ingeniería de Software </a:t>
             </a:r>
             <a:endParaRPr lang="es-MX" dirty="0"/>
           </a:p>
@@ -6335,27 +6353,12 @@
           <a:bodyPr/>
           <a:lstStyle/>
           <a:p>
+            <a:endParaRPr lang="es-MX" dirty="0" smtClean="0"/>
+          </a:p>
+          <a:p>
             <a:r>
               <a:rPr lang="es-MX" dirty="0" smtClean="0"/>
-              <a:t>Determinar causa de los problemas.</a:t>
-            </a:r>
-          </a:p>
-          <a:p>
-            <a:endParaRPr lang="es-MX" dirty="0" smtClean="0"/>
-          </a:p>
-          <a:p>
-            <a:r>
-              <a:rPr lang="es-MX" dirty="0" smtClean="0"/>
-              <a:t>Factores mas importantes de un problema.</a:t>
-            </a:r>
-          </a:p>
-          <a:p>
-            <a:endParaRPr lang="es-MX" dirty="0" smtClean="0"/>
-          </a:p>
-          <a:p>
-            <a:r>
-              <a:rPr lang="es-MX" dirty="0" smtClean="0"/>
-              <a:t>Decidir el objetivo de mejora y los elementos a mejorar.</a:t>
+              <a:t>El 80 % del esfuerzo de desarrollo (en tiempo y recursos) produce el 20 % del código, mientras que el 80 % restante es producido con tan solo un 20 % del esfuerzo.</a:t>
             </a:r>
             <a:endParaRPr lang="es-MX" dirty="0"/>
           </a:p>
@@ -6364,13 +6367,20 @@
     </p:spTree>
     <p:extLst>
       <p:ext uri="{BB962C8B-B14F-4D97-AF65-F5344CB8AC3E}">
-        <p14:creationId xmlns:p14="http://schemas.microsoft.com/office/powerpoint/2010/main" val="924261272"/>
+        <p14:creationId xmlns:p14="http://schemas.microsoft.com/office/powerpoint/2010/main" val="527068628"/>
       </p:ext>
     </p:extLst>
   </p:cSld>
   <p:clrMapOvr>
     <a:masterClrMapping/>
   </p:clrMapOvr>
+  <p:timing>
+    <p:tnLst>
+      <p:par>
+        <p:cTn id="1" dur="indefinite" restart="never" nodeType="tmRoot"/>
+      </p:par>
+    </p:tnLst>
+  </p:timing>
 </p:sld>
 </file>
 
@@ -6408,7 +6418,7 @@
           <a:p>
             <a:r>
               <a:rPr lang="es-MX" dirty="0" smtClean="0"/>
-              <a:t>Ingeniería de Software </a:t>
+              <a:t>Pruebas de Software</a:t>
             </a:r>
             <a:endParaRPr lang="es-MX" dirty="0"/>
           </a:p>
@@ -6434,7 +6444,7 @@
           <a:p>
             <a:r>
               <a:rPr lang="es-MX" dirty="0" smtClean="0"/>
-              <a:t>El 80 % del esfuerzo de desarrollo (en tiempo y recursos) produce el 20 % del código, mientras que el 80 % restante es producido con tan solo un 20 % del esfuerzo.</a:t>
+              <a:t>El principio nos dice que "el 80 % de los fallos de un software es generado por un 20 % del código de dicho software, mientras que el otro 80 % genera tan solo un 20 % de los fallos".</a:t>
             </a:r>
             <a:endParaRPr lang="es-MX" dirty="0"/>
           </a:p>
@@ -6443,7 +6453,7 @@
     </p:spTree>
     <p:extLst>
       <p:ext uri="{BB962C8B-B14F-4D97-AF65-F5344CB8AC3E}">
-        <p14:creationId xmlns:p14="http://schemas.microsoft.com/office/powerpoint/2010/main" val="527068628"/>
+        <p14:creationId xmlns:p14="http://schemas.microsoft.com/office/powerpoint/2010/main" val="773527355"/>
       </p:ext>
     </p:extLst>
   </p:cSld>
@@ -6479,7 +6489,7 @@
       </p:grpSpPr>
       <p:sp>
         <p:nvSpPr>
-          <p:cNvPr id="2" name="1 Título"/>
+          <p:cNvPr id="2" name="Título 1"/>
           <p:cNvSpPr>
             <a:spLocks noGrp="1"/>
           </p:cNvSpPr>
@@ -6492,36 +6502,53 @@
           <a:bodyPr/>
           <a:lstStyle/>
           <a:p>
+            <a:endParaRPr lang="es-MX"/>
+          </a:p>
+        </p:txBody>
+      </p:sp>
+      <p:sp>
+        <p:nvSpPr>
+          <p:cNvPr id="3" name="Marcador de contenido 2"/>
+          <p:cNvSpPr>
+            <a:spLocks noGrp="1"/>
+          </p:cNvSpPr>
+          <p:nvPr>
+            <p:ph sz="quarter" idx="1"/>
+          </p:nvPr>
+        </p:nvSpPr>
+        <p:spPr/>
+        <p:txBody>
+          <a:bodyPr/>
+          <a:lstStyle/>
+          <a:p>
+            <a:r>
+              <a:rPr lang="es-MX" dirty="0"/>
+              <a:t>Las Tablas y Diagramas de Pareto son herramientas de representación </a:t>
+            </a:r>
             <a:r>
               <a:rPr lang="es-MX" dirty="0" smtClean="0"/>
-              <a:t>Pruebas de Software</a:t>
-            </a:r>
-            <a:endParaRPr lang="es-MX" dirty="0"/>
-          </a:p>
-        </p:txBody>
-      </p:sp>
-      <p:sp>
-        <p:nvSpPr>
-          <p:cNvPr id="3" name="2 Marcador de contenido"/>
-          <p:cNvSpPr>
-            <a:spLocks noGrp="1"/>
-          </p:cNvSpPr>
-          <p:nvPr>
-            <p:ph sz="quarter" idx="1"/>
-          </p:nvPr>
-        </p:nvSpPr>
-        <p:spPr/>
-        <p:txBody>
-          <a:bodyPr/>
-          <a:lstStyle/>
-          <a:p>
-            <a:endParaRPr lang="es-MX" dirty="0" smtClean="0"/>
-          </a:p>
-          <a:p>
+              <a:t>utilizadas para </a:t>
+            </a:r>
+            <a:r>
+              <a:rPr lang="es-MX" dirty="0"/>
+              <a:t>visualizar el Análisis de Pareto.</a:t>
+            </a:r>
+          </a:p>
+          <a:p>
+            <a:r>
+              <a:rPr lang="es-MX" dirty="0"/>
+              <a:t>El Diagrama de Pareto es la representación gráfica de la Tabla de </a:t>
+            </a:r>
             <a:r>
               <a:rPr lang="es-MX" dirty="0" smtClean="0"/>
-              <a:t>El principio nos dice que "el 80 % de los fallos de un software es generado por un 20 % del código de dicho software, mientras que el otro 80 % genera tan solo un 20 % de los fallos".</a:t>
-            </a:r>
+              <a:t>Pareto correspondiente</a:t>
+            </a:r>
+            <a:r>
+              <a:rPr lang="es-MX" dirty="0"/>
+              <a:t>.</a:t>
+            </a:r>
+          </a:p>
+          <a:p>
             <a:endParaRPr lang="es-MX" dirty="0"/>
           </a:p>
         </p:txBody>
@@ -6529,24 +6556,843 @@
     </p:spTree>
     <p:extLst>
       <p:ext uri="{BB962C8B-B14F-4D97-AF65-F5344CB8AC3E}">
-        <p14:creationId xmlns:p14="http://schemas.microsoft.com/office/powerpoint/2010/main" val="773527355"/>
+        <p14:creationId xmlns:p14="http://schemas.microsoft.com/office/powerpoint/2010/main" val="601317714"/>
       </p:ext>
     </p:extLst>
   </p:cSld>
   <p:clrMapOvr>
     <a:masterClrMapping/>
   </p:clrMapOvr>
-  <p:timing>
-    <p:tnLst>
-      <p:par>
-        <p:cTn id="1" dur="indefinite" restart="never" nodeType="tmRoot"/>
-      </p:par>
-    </p:tnLst>
-  </p:timing>
 </p:sld>
 </file>
 
 <file path=ppt/slides/slide6.xml><?xml version="1.0" encoding="utf-8"?>
+<p:sld xmlns:a="http://schemas.openxmlformats.org/drawingml/2006/main" xmlns:r="http://schemas.openxmlformats.org/officeDocument/2006/relationships" xmlns:p="http://schemas.openxmlformats.org/presentationml/2006/main">
+  <p:cSld>
+    <p:spTree>
+      <p:nvGrpSpPr>
+        <p:cNvPr id="1" name=""/>
+        <p:cNvGrpSpPr/>
+        <p:nvPr/>
+      </p:nvGrpSpPr>
+      <p:grpSpPr>
+        <a:xfrm>
+          <a:off x="0" y="0"/>
+          <a:ext cx="0" cy="0"/>
+          <a:chOff x="0" y="0"/>
+          <a:chExt cx="0" cy="0"/>
+        </a:xfrm>
+      </p:grpSpPr>
+      <p:sp>
+        <p:nvSpPr>
+          <p:cNvPr id="2" name="Título 1"/>
+          <p:cNvSpPr>
+            <a:spLocks noGrp="1"/>
+          </p:cNvSpPr>
+          <p:nvPr>
+            <p:ph type="title"/>
+          </p:nvPr>
+        </p:nvSpPr>
+        <p:spPr/>
+        <p:txBody>
+          <a:bodyPr/>
+          <a:lstStyle/>
+          <a:p>
+            <a:r>
+              <a:rPr lang="es-MX" dirty="0"/>
+              <a:t>Características principales </a:t>
+            </a:r>
+          </a:p>
+        </p:txBody>
+      </p:sp>
+      <p:sp>
+        <p:nvSpPr>
+          <p:cNvPr id="3" name="Marcador de contenido 2"/>
+          <p:cNvSpPr>
+            <a:spLocks noGrp="1"/>
+          </p:cNvSpPr>
+          <p:nvPr>
+            <p:ph sz="quarter" idx="1"/>
+          </p:nvPr>
+        </p:nvSpPr>
+        <p:spPr/>
+        <p:txBody>
+          <a:bodyPr/>
+          <a:lstStyle/>
+          <a:p>
+            <a:r>
+              <a:rPr lang="es-MX" dirty="0" smtClean="0"/>
+              <a:t>Simplicidad: </a:t>
+            </a:r>
+            <a:r>
+              <a:rPr lang="es-MX" dirty="0"/>
+              <a:t>Tanto la Tabla como el Diagrama de Pareto no requieren ni cálculos complejos ni técnicas sofisticadas de representación gráfica. </a:t>
+            </a:r>
+            <a:endParaRPr lang="es-MX" dirty="0" smtClean="0"/>
+          </a:p>
+          <a:p>
+            <a:r>
+              <a:rPr lang="es-MX" dirty="0" smtClean="0"/>
+              <a:t>Impacto visual: </a:t>
+            </a:r>
+            <a:r>
+              <a:rPr lang="es-MX" dirty="0"/>
+              <a:t>El Diagrama de Pareto comunica de forma clara, evidente y de un "vistazo", el resultado del análisis de comparación y priorización.</a:t>
+            </a:r>
+          </a:p>
+        </p:txBody>
+      </p:sp>
+    </p:spTree>
+    <p:extLst>
+      <p:ext uri="{BB962C8B-B14F-4D97-AF65-F5344CB8AC3E}">
+        <p14:creationId xmlns:p14="http://schemas.microsoft.com/office/powerpoint/2010/main" val="2699632386"/>
+      </p:ext>
+    </p:extLst>
+  </p:cSld>
+  <p:clrMapOvr>
+    <a:masterClrMapping/>
+  </p:clrMapOvr>
+</p:sld>
+</file>
+
+<file path=ppt/slides/slide7.xml><?xml version="1.0" encoding="utf-8"?>
+<p:sld xmlns:a="http://schemas.openxmlformats.org/drawingml/2006/main" xmlns:r="http://schemas.openxmlformats.org/officeDocument/2006/relationships" xmlns:p="http://schemas.openxmlformats.org/presentationml/2006/main">
+  <p:cSld>
+    <p:spTree>
+      <p:nvGrpSpPr>
+        <p:cNvPr id="1" name=""/>
+        <p:cNvGrpSpPr/>
+        <p:nvPr/>
+      </p:nvGrpSpPr>
+      <p:grpSpPr>
+        <a:xfrm>
+          <a:off x="0" y="0"/>
+          <a:ext cx="0" cy="0"/>
+          <a:chOff x="0" y="0"/>
+          <a:chExt cx="0" cy="0"/>
+        </a:xfrm>
+      </p:grpSpPr>
+      <p:sp>
+        <p:nvSpPr>
+          <p:cNvPr id="2" name="Título 1"/>
+          <p:cNvSpPr>
+            <a:spLocks noGrp="1"/>
+          </p:cNvSpPr>
+          <p:nvPr>
+            <p:ph type="title"/>
+          </p:nvPr>
+        </p:nvSpPr>
+        <p:spPr>
+          <a:xfrm>
+            <a:off x="286512" y="404664"/>
+            <a:ext cx="8534400" cy="758952"/>
+          </a:xfrm>
+        </p:spPr>
+        <p:txBody>
+          <a:bodyPr>
+            <a:normAutofit fontScale="90000"/>
+          </a:bodyPr>
+          <a:lstStyle/>
+          <a:p>
+            <a:r>
+              <a:rPr lang="es-MX" b="1" dirty="0" smtClean="0"/>
+              <a:t/>
+            </a:r>
+            <a:br>
+              <a:rPr lang="es-MX" b="1" dirty="0" smtClean="0"/>
+            </a:br>
+            <a:r>
+              <a:rPr lang="es-MX" b="1" dirty="0"/>
+              <a:t/>
+            </a:r>
+            <a:br>
+              <a:rPr lang="es-MX" b="1" dirty="0"/>
+            </a:br>
+            <a:r>
+              <a:rPr lang="es-MX" b="1" dirty="0" smtClean="0"/>
+              <a:t/>
+            </a:r>
+            <a:br>
+              <a:rPr lang="es-MX" b="1" dirty="0" smtClean="0"/>
+            </a:br>
+            <a:r>
+              <a:rPr lang="es-MX" b="1" dirty="0"/>
+              <a:t/>
+            </a:r>
+            <a:br>
+              <a:rPr lang="es-MX" b="1" dirty="0"/>
+            </a:br>
+            <a:r>
+              <a:rPr lang="es-MX" b="1" dirty="0" smtClean="0"/>
+              <a:t/>
+            </a:r>
+            <a:br>
+              <a:rPr lang="es-MX" b="1" dirty="0" smtClean="0"/>
+            </a:br>
+            <a:r>
+              <a:rPr lang="es-MX" b="1" dirty="0"/>
+              <a:t/>
+            </a:r>
+            <a:br>
+              <a:rPr lang="es-MX" b="1" dirty="0"/>
+            </a:br>
+            <a:r>
+              <a:rPr lang="es-MX" b="1" dirty="0" smtClean="0"/>
+              <a:t/>
+            </a:r>
+            <a:br>
+              <a:rPr lang="es-MX" b="1" dirty="0" smtClean="0"/>
+            </a:br>
+            <a:r>
+              <a:rPr lang="es-MX" b="1" dirty="0"/>
+              <a:t/>
+            </a:r>
+            <a:br>
+              <a:rPr lang="es-MX" b="1" dirty="0"/>
+            </a:br>
+            <a:r>
+              <a:rPr lang="es-MX" b="1" dirty="0" smtClean="0"/>
+              <a:t/>
+            </a:r>
+            <a:br>
+              <a:rPr lang="es-MX" b="1" dirty="0" smtClean="0"/>
+            </a:br>
+            <a:r>
+              <a:rPr lang="es-MX" b="1" dirty="0"/>
+              <a:t/>
+            </a:r>
+            <a:br>
+              <a:rPr lang="es-MX" b="1" dirty="0"/>
+            </a:br>
+            <a:r>
+              <a:rPr lang="es-MX" b="1" dirty="0" smtClean="0"/>
+              <a:t/>
+            </a:r>
+            <a:br>
+              <a:rPr lang="es-MX" b="1" dirty="0" smtClean="0"/>
+            </a:br>
+            <a:r>
+              <a:rPr lang="es-MX" b="1" dirty="0"/>
+              <a:t/>
+            </a:r>
+            <a:br>
+              <a:rPr lang="es-MX" b="1" dirty="0"/>
+            </a:br>
+            <a:r>
+              <a:rPr lang="es-MX" b="1" dirty="0" smtClean="0"/>
+              <a:t/>
+            </a:r>
+            <a:br>
+              <a:rPr lang="es-MX" b="1" dirty="0" smtClean="0"/>
+            </a:br>
+            <a:r>
+              <a:rPr lang="es-MX" b="1" dirty="0"/>
+              <a:t/>
+            </a:r>
+            <a:br>
+              <a:rPr lang="es-MX" b="1" dirty="0"/>
+            </a:br>
+            <a:r>
+              <a:rPr lang="es-MX" b="1" dirty="0" smtClean="0"/>
+              <a:t/>
+            </a:r>
+            <a:br>
+              <a:rPr lang="es-MX" b="1" dirty="0" smtClean="0"/>
+            </a:br>
+            <a:r>
+              <a:rPr lang="es-MX" b="1" dirty="0"/>
+              <a:t/>
+            </a:r>
+            <a:br>
+              <a:rPr lang="es-MX" b="1" dirty="0"/>
+            </a:br>
+            <a:r>
+              <a:rPr lang="es-MX" b="1" dirty="0" smtClean="0"/>
+              <a:t/>
+            </a:r>
+            <a:br>
+              <a:rPr lang="es-MX" b="1" dirty="0" smtClean="0"/>
+            </a:br>
+            <a:r>
+              <a:rPr lang="es-MX" b="1" dirty="0"/>
+              <a:t/>
+            </a:r>
+            <a:br>
+              <a:rPr lang="es-MX" b="1" dirty="0"/>
+            </a:br>
+            <a:r>
+              <a:rPr lang="es-MX" b="1" dirty="0" smtClean="0"/>
+              <a:t/>
+            </a:r>
+            <a:br>
+              <a:rPr lang="es-MX" b="1" dirty="0" smtClean="0"/>
+            </a:br>
+            <a:r>
+              <a:rPr lang="es-MX" b="1" dirty="0"/>
+              <a:t/>
+            </a:r>
+            <a:br>
+              <a:rPr lang="es-MX" b="1" dirty="0"/>
+            </a:br>
+            <a:r>
+              <a:rPr lang="es-MX" b="1" dirty="0" smtClean="0"/>
+              <a:t/>
+            </a:r>
+            <a:br>
+              <a:rPr lang="es-MX" b="1" dirty="0" smtClean="0"/>
+            </a:br>
+            <a:r>
+              <a:rPr lang="es-MX" b="1" dirty="0"/>
+              <a:t/>
+            </a:r>
+            <a:br>
+              <a:rPr lang="es-MX" b="1" dirty="0"/>
+            </a:br>
+            <a:r>
+              <a:rPr lang="es-MX" b="1" dirty="0" smtClean="0"/>
+              <a:t/>
+            </a:r>
+            <a:br>
+              <a:rPr lang="es-MX" b="1" dirty="0" smtClean="0"/>
+            </a:br>
+            <a:r>
+              <a:rPr lang="es-MX" b="1" dirty="0"/>
+              <a:t/>
+            </a:r>
+            <a:br>
+              <a:rPr lang="es-MX" b="1" dirty="0"/>
+            </a:br>
+            <a:r>
+              <a:rPr lang="es-MX" b="1" dirty="0" smtClean="0"/>
+              <a:t/>
+            </a:r>
+            <a:br>
+              <a:rPr lang="es-MX" b="1" dirty="0" smtClean="0"/>
+            </a:br>
+            <a:r>
+              <a:rPr lang="es-MX" b="1" dirty="0"/>
+              <a:t/>
+            </a:r>
+            <a:br>
+              <a:rPr lang="es-MX" b="1" dirty="0"/>
+            </a:br>
+            <a:r>
+              <a:rPr lang="es-MX" b="1" dirty="0" smtClean="0"/>
+              <a:t/>
+            </a:r>
+            <a:br>
+              <a:rPr lang="es-MX" b="1" dirty="0" smtClean="0"/>
+            </a:br>
+            <a:r>
+              <a:rPr lang="es-MX" b="1" dirty="0"/>
+              <a:t/>
+            </a:r>
+            <a:br>
+              <a:rPr lang="es-MX" b="1" dirty="0"/>
+            </a:br>
+            <a:r>
+              <a:rPr lang="es-MX" b="1" dirty="0" smtClean="0"/>
+              <a:t/>
+            </a:r>
+            <a:br>
+              <a:rPr lang="es-MX" b="1" dirty="0" smtClean="0"/>
+            </a:br>
+            <a:r>
+              <a:rPr lang="es-MX" b="1" dirty="0"/>
+              <a:t/>
+            </a:r>
+            <a:br>
+              <a:rPr lang="es-MX" b="1" dirty="0"/>
+            </a:br>
+            <a:r>
+              <a:rPr lang="es-MX" b="1" dirty="0" smtClean="0"/>
+              <a:t/>
+            </a:r>
+            <a:br>
+              <a:rPr lang="es-MX" b="1" dirty="0" smtClean="0"/>
+            </a:br>
+            <a:r>
+              <a:rPr lang="es-MX" b="1" dirty="0"/>
+              <a:t/>
+            </a:r>
+            <a:br>
+              <a:rPr lang="es-MX" b="1" dirty="0"/>
+            </a:br>
+            <a:r>
+              <a:rPr lang="es-MX" b="1" dirty="0" smtClean="0"/>
+              <a:t/>
+            </a:r>
+            <a:br>
+              <a:rPr lang="es-MX" b="1" dirty="0" smtClean="0"/>
+            </a:br>
+            <a:r>
+              <a:rPr lang="es-MX" b="1" dirty="0"/>
+              <a:t/>
+            </a:r>
+            <a:br>
+              <a:rPr lang="es-MX" b="1" dirty="0"/>
+            </a:br>
+            <a:r>
+              <a:rPr lang="es-MX" b="1" dirty="0" smtClean="0"/>
+              <a:t/>
+            </a:r>
+            <a:br>
+              <a:rPr lang="es-MX" b="1" dirty="0" smtClean="0"/>
+            </a:br>
+            <a:r>
+              <a:rPr lang="es-MX" b="1" dirty="0"/>
+              <a:t/>
+            </a:r>
+            <a:br>
+              <a:rPr lang="es-MX" b="1" dirty="0"/>
+            </a:br>
+            <a:r>
+              <a:rPr lang="es-MX" b="1" dirty="0" smtClean="0"/>
+              <a:t/>
+            </a:r>
+            <a:br>
+              <a:rPr lang="es-MX" b="1" dirty="0" smtClean="0"/>
+            </a:br>
+            <a:r>
+              <a:rPr lang="es-MX" b="1" dirty="0"/>
+              <a:t/>
+            </a:r>
+            <a:br>
+              <a:rPr lang="es-MX" b="1" dirty="0"/>
+            </a:br>
+            <a:r>
+              <a:rPr lang="es-MX" b="1" dirty="0" smtClean="0"/>
+              <a:t/>
+            </a:r>
+            <a:br>
+              <a:rPr lang="es-MX" b="1" dirty="0" smtClean="0"/>
+            </a:br>
+            <a:r>
+              <a:rPr lang="es-MX" b="1" dirty="0"/>
+              <a:t/>
+            </a:r>
+            <a:br>
+              <a:rPr lang="es-MX" b="1" dirty="0"/>
+            </a:br>
+            <a:r>
+              <a:rPr lang="es-MX" b="1" dirty="0" smtClean="0"/>
+              <a:t/>
+            </a:r>
+            <a:br>
+              <a:rPr lang="es-MX" b="1" dirty="0" smtClean="0"/>
+            </a:br>
+            <a:r>
+              <a:rPr lang="es-MX" b="1" dirty="0"/>
+              <a:t/>
+            </a:r>
+            <a:br>
+              <a:rPr lang="es-MX" b="1" dirty="0"/>
+            </a:br>
+            <a:r>
+              <a:rPr lang="es-MX" b="1" dirty="0" smtClean="0"/>
+              <a:t/>
+            </a:r>
+            <a:br>
+              <a:rPr lang="es-MX" b="1" dirty="0" smtClean="0"/>
+            </a:br>
+            <a:r>
+              <a:rPr lang="es-MX" b="1" dirty="0"/>
+              <a:t/>
+            </a:r>
+            <a:br>
+              <a:rPr lang="es-MX" b="1" dirty="0"/>
+            </a:br>
+            <a:r>
+              <a:rPr lang="es-MX" b="1" dirty="0" smtClean="0"/>
+              <a:t/>
+            </a:r>
+            <a:br>
+              <a:rPr lang="es-MX" b="1" dirty="0" smtClean="0"/>
+            </a:br>
+            <a:r>
+              <a:rPr lang="es-MX" b="1" dirty="0"/>
+              <a:t/>
+            </a:r>
+            <a:br>
+              <a:rPr lang="es-MX" b="1" dirty="0"/>
+            </a:br>
+            <a:r>
+              <a:rPr lang="es-MX" b="1" dirty="0" smtClean="0"/>
+              <a:t/>
+            </a:r>
+            <a:br>
+              <a:rPr lang="es-MX" b="1" dirty="0" smtClean="0"/>
+            </a:br>
+            <a:r>
+              <a:rPr lang="es-MX" b="1" dirty="0"/>
+              <a:t/>
+            </a:r>
+            <a:br>
+              <a:rPr lang="es-MX" b="1" dirty="0"/>
+            </a:br>
+            <a:r>
+              <a:rPr lang="es-MX" b="1" dirty="0" smtClean="0"/>
+              <a:t/>
+            </a:r>
+            <a:br>
+              <a:rPr lang="es-MX" b="1" dirty="0" smtClean="0"/>
+            </a:br>
+            <a:r>
+              <a:rPr lang="es-MX" b="1" dirty="0"/>
+              <a:t/>
+            </a:r>
+            <a:br>
+              <a:rPr lang="es-MX" b="1" dirty="0"/>
+            </a:br>
+            <a:r>
+              <a:rPr lang="es-MX" b="1" dirty="0" smtClean="0"/>
+              <a:t/>
+            </a:r>
+            <a:br>
+              <a:rPr lang="es-MX" b="1" dirty="0" smtClean="0"/>
+            </a:br>
+            <a:r>
+              <a:rPr lang="es-MX" b="1" dirty="0"/>
+              <a:t/>
+            </a:r>
+            <a:br>
+              <a:rPr lang="es-MX" b="1" dirty="0"/>
+            </a:br>
+            <a:r>
+              <a:rPr lang="es-MX" b="1" dirty="0" smtClean="0"/>
+              <a:t/>
+            </a:r>
+            <a:br>
+              <a:rPr lang="es-MX" b="1" dirty="0" smtClean="0"/>
+            </a:br>
+            <a:r>
+              <a:rPr lang="es-MX" b="1" dirty="0"/>
+              <a:t/>
+            </a:r>
+            <a:br>
+              <a:rPr lang="es-MX" b="1" dirty="0"/>
+            </a:br>
+            <a:r>
+              <a:rPr lang="es-MX" b="1" dirty="0" smtClean="0"/>
+              <a:t/>
+            </a:r>
+            <a:br>
+              <a:rPr lang="es-MX" b="1" dirty="0" smtClean="0"/>
+            </a:br>
+            <a:r>
+              <a:rPr lang="es-MX" b="1" dirty="0"/>
+              <a:t/>
+            </a:r>
+            <a:br>
+              <a:rPr lang="es-MX" b="1" dirty="0"/>
+            </a:br>
+            <a:r>
+              <a:rPr lang="es-MX" b="1" dirty="0" smtClean="0"/>
+              <a:t/>
+            </a:r>
+            <a:br>
+              <a:rPr lang="es-MX" b="1" dirty="0" smtClean="0"/>
+            </a:br>
+            <a:r>
+              <a:rPr lang="es-MX" b="1" dirty="0"/>
+              <a:t/>
+            </a:r>
+            <a:br>
+              <a:rPr lang="es-MX" b="1" dirty="0"/>
+            </a:br>
+            <a:r>
+              <a:rPr lang="es-MX" b="1" dirty="0" smtClean="0"/>
+              <a:t/>
+            </a:r>
+            <a:br>
+              <a:rPr lang="es-MX" b="1" dirty="0" smtClean="0"/>
+            </a:br>
+            <a:r>
+              <a:rPr lang="es-MX" b="1" dirty="0"/>
+              <a:t/>
+            </a:r>
+            <a:br>
+              <a:rPr lang="es-MX" b="1" dirty="0"/>
+            </a:br>
+            <a:r>
+              <a:rPr lang="es-MX" b="1" dirty="0" smtClean="0"/>
+              <a:t/>
+            </a:r>
+            <a:br>
+              <a:rPr lang="es-MX" b="1" dirty="0" smtClean="0"/>
+            </a:br>
+            <a:r>
+              <a:rPr lang="es-MX" b="1" dirty="0"/>
+              <a:t/>
+            </a:r>
+            <a:br>
+              <a:rPr lang="es-MX" b="1" dirty="0"/>
+            </a:br>
+            <a:r>
+              <a:rPr lang="es-MX" b="1" dirty="0" smtClean="0"/>
+              <a:t/>
+            </a:r>
+            <a:br>
+              <a:rPr lang="es-MX" b="1" dirty="0" smtClean="0"/>
+            </a:br>
+            <a:r>
+              <a:rPr lang="es-MX" b="1" dirty="0"/>
+              <a:t/>
+            </a:r>
+            <a:br>
+              <a:rPr lang="es-MX" b="1" dirty="0"/>
+            </a:br>
+            <a:r>
+              <a:rPr lang="es-MX" b="1" dirty="0" smtClean="0"/>
+              <a:t/>
+            </a:r>
+            <a:br>
+              <a:rPr lang="es-MX" b="1" dirty="0" smtClean="0"/>
+            </a:br>
+            <a:r>
+              <a:rPr lang="es-MX" b="1" dirty="0"/>
+              <a:t/>
+            </a:r>
+            <a:br>
+              <a:rPr lang="es-MX" b="1" dirty="0"/>
+            </a:br>
+            <a:r>
+              <a:rPr lang="es-MX" b="1" dirty="0" smtClean="0"/>
+              <a:t/>
+            </a:r>
+            <a:br>
+              <a:rPr lang="es-MX" b="1" dirty="0" smtClean="0"/>
+            </a:br>
+            <a:r>
+              <a:rPr lang="es-MX" b="1" dirty="0"/>
+              <a:t/>
+            </a:r>
+            <a:br>
+              <a:rPr lang="es-MX" b="1" dirty="0"/>
+            </a:br>
+            <a:r>
+              <a:rPr lang="es-MX" b="1" dirty="0" smtClean="0"/>
+              <a:t/>
+            </a:r>
+            <a:br>
+              <a:rPr lang="es-MX" b="1" dirty="0" smtClean="0"/>
+            </a:br>
+            <a:r>
+              <a:rPr lang="es-MX" b="1" dirty="0"/>
+              <a:t/>
+            </a:r>
+            <a:br>
+              <a:rPr lang="es-MX" b="1" dirty="0"/>
+            </a:br>
+            <a:r>
+              <a:rPr lang="es-MX" b="1" dirty="0" smtClean="0"/>
+              <a:t/>
+            </a:r>
+            <a:br>
+              <a:rPr lang="es-MX" b="1" dirty="0" smtClean="0"/>
+            </a:br>
+            <a:r>
+              <a:rPr lang="es-MX" b="1" dirty="0"/>
+              <a:t/>
+            </a:r>
+            <a:br>
+              <a:rPr lang="es-MX" b="1" dirty="0"/>
+            </a:br>
+            <a:r>
+              <a:rPr lang="es-MX" b="1" dirty="0" smtClean="0"/>
+              <a:t/>
+            </a:r>
+            <a:br>
+              <a:rPr lang="es-MX" b="1" dirty="0" smtClean="0"/>
+            </a:br>
+            <a:r>
+              <a:rPr lang="es-MX" b="1" dirty="0"/>
+              <a:t/>
+            </a:r>
+            <a:br>
+              <a:rPr lang="es-MX" b="1" dirty="0"/>
+            </a:br>
+            <a:r>
+              <a:rPr lang="es-MX" b="1" dirty="0" smtClean="0"/>
+              <a:t/>
+            </a:r>
+            <a:br>
+              <a:rPr lang="es-MX" b="1" dirty="0" smtClean="0"/>
+            </a:br>
+            <a:r>
+              <a:rPr lang="es-MX" b="1" dirty="0"/>
+              <a:t/>
+            </a:r>
+            <a:br>
+              <a:rPr lang="es-MX" b="1" dirty="0"/>
+            </a:br>
+            <a:r>
+              <a:rPr lang="es-MX" b="1" dirty="0" smtClean="0"/>
+              <a:t/>
+            </a:r>
+            <a:br>
+              <a:rPr lang="es-MX" b="1" dirty="0" smtClean="0"/>
+            </a:br>
+            <a:r>
+              <a:rPr lang="es-MX" b="1" dirty="0"/>
+              <a:t/>
+            </a:r>
+            <a:br>
+              <a:rPr lang="es-MX" b="1" dirty="0"/>
+            </a:br>
+            <a:r>
+              <a:rPr lang="es-MX" b="1" dirty="0" smtClean="0"/>
+              <a:t/>
+            </a:r>
+            <a:br>
+              <a:rPr lang="es-MX" b="1" dirty="0" smtClean="0"/>
+            </a:br>
+            <a:r>
+              <a:rPr lang="es-MX" b="1" dirty="0"/>
+              <a:t/>
+            </a:r>
+            <a:br>
+              <a:rPr lang="es-MX" b="1" dirty="0"/>
+            </a:br>
+            <a:r>
+              <a:rPr lang="es-MX" b="1" dirty="0" smtClean="0"/>
+              <a:t/>
+            </a:r>
+            <a:br>
+              <a:rPr lang="es-MX" b="1" dirty="0" smtClean="0"/>
+            </a:br>
+            <a:r>
+              <a:rPr lang="es-MX" b="1" dirty="0"/>
+              <a:t/>
+            </a:r>
+            <a:br>
+              <a:rPr lang="es-MX" b="1" dirty="0"/>
+            </a:br>
+            <a:r>
+              <a:rPr lang="es-MX" b="1" dirty="0" smtClean="0"/>
+              <a:t/>
+            </a:r>
+            <a:br>
+              <a:rPr lang="es-MX" b="1" dirty="0" smtClean="0"/>
+            </a:br>
+            <a:r>
+              <a:rPr lang="es-MX" b="1" dirty="0" smtClean="0"/>
+              <a:t>¿</a:t>
+            </a:r>
+            <a:r>
+              <a:rPr lang="es-MX" b="1" dirty="0"/>
+              <a:t>Cuándo se utiliza?</a:t>
+            </a:r>
+            <a:br>
+              <a:rPr lang="es-MX" b="1" dirty="0"/>
+            </a:br>
+            <a:endParaRPr lang="es-MX" dirty="0"/>
+          </a:p>
+        </p:txBody>
+      </p:sp>
+      <p:sp>
+        <p:nvSpPr>
+          <p:cNvPr id="3" name="Marcador de contenido 2"/>
+          <p:cNvSpPr>
+            <a:spLocks noGrp="1"/>
+          </p:cNvSpPr>
+          <p:nvPr>
+            <p:ph sz="quarter" idx="1"/>
+          </p:nvPr>
+        </p:nvSpPr>
+        <p:spPr/>
+        <p:txBody>
+          <a:bodyPr>
+            <a:normAutofit fontScale="85000" lnSpcReduction="20000"/>
+          </a:bodyPr>
+          <a:lstStyle/>
+          <a:p>
+            <a:r>
+              <a:rPr lang="es-MX" dirty="0" smtClean="0"/>
+              <a:t>Al </a:t>
+            </a:r>
+            <a:r>
+              <a:rPr lang="es-MX" dirty="0"/>
+              <a:t>identificar un producto o servicio para el análisis para mejorar la calidad.</a:t>
+            </a:r>
+          </a:p>
+          <a:p>
+            <a:r>
+              <a:rPr lang="es-MX" dirty="0"/>
+              <a:t>Cuando existe la necesidad de llamar la atención a los problema o causas de una forma sistemática.</a:t>
+            </a:r>
+          </a:p>
+          <a:p>
+            <a:r>
+              <a:rPr lang="es-MX" dirty="0"/>
+              <a:t>Al identificar oportunidades para mejorar</a:t>
+            </a:r>
+          </a:p>
+          <a:p>
+            <a:r>
+              <a:rPr lang="es-MX" dirty="0"/>
+              <a:t>Al analizar las diferentes agrupaciones de datos (</a:t>
+            </a:r>
+            <a:r>
+              <a:rPr lang="es-MX" dirty="0" err="1"/>
+              <a:t>ej</a:t>
+            </a:r>
+            <a:r>
+              <a:rPr lang="es-MX" dirty="0"/>
+              <a:t>: por producto, por segmento, del mercado, área geográfica, etc.)</a:t>
+            </a:r>
+          </a:p>
+          <a:p>
+            <a:r>
+              <a:rPr lang="es-MX" dirty="0"/>
+              <a:t>Al buscar las causas principales de los problemas y establecer la prioridad de las soluciones</a:t>
+            </a:r>
+          </a:p>
+          <a:p>
+            <a:r>
+              <a:rPr lang="es-MX" dirty="0"/>
+              <a:t>Al evaluar los resultados de los </a:t>
+            </a:r>
+            <a:r>
+              <a:rPr lang="es-MX" dirty="0" err="1"/>
+              <a:t>cambos</a:t>
+            </a:r>
+            <a:r>
+              <a:rPr lang="es-MX" dirty="0"/>
+              <a:t> efectuados a un proceso (antes y después)</a:t>
+            </a:r>
+          </a:p>
+          <a:p>
+            <a:r>
+              <a:rPr lang="es-MX" dirty="0"/>
+              <a:t>Cuando los datos puedan clasificarse en categorías</a:t>
+            </a:r>
+          </a:p>
+          <a:p>
+            <a:r>
+              <a:rPr lang="es-MX" dirty="0"/>
+              <a:t>Cuando el rango de cada categoría es importante</a:t>
+            </a:r>
+          </a:p>
+          <a:p>
+            <a:endParaRPr lang="es-MX" dirty="0"/>
+          </a:p>
+        </p:txBody>
+      </p:sp>
+    </p:spTree>
+    <p:extLst>
+      <p:ext uri="{BB962C8B-B14F-4D97-AF65-F5344CB8AC3E}">
+        <p14:creationId xmlns:p14="http://schemas.microsoft.com/office/powerpoint/2010/main" val="151946647"/>
+      </p:ext>
+    </p:extLst>
+  </p:cSld>
+  <p:clrMapOvr>
+    <a:masterClrMapping/>
+  </p:clrMapOvr>
+</p:sld>
+</file>
+
+<file path=ppt/slides/slide8.xml><?xml version="1.0" encoding="utf-8"?>
 <p:sld xmlns:a="http://schemas.openxmlformats.org/drawingml/2006/main" xmlns:r="http://schemas.openxmlformats.org/officeDocument/2006/relationships" xmlns:p="http://schemas.openxmlformats.org/presentationml/2006/main">
   <p:cSld>
     <p:spTree>
@@ -6695,7 +7541,7 @@
 </p:sld>
 </file>
 
-<file path=ppt/slides/slide7.xml><?xml version="1.0" encoding="utf-8"?>
+<file path=ppt/slides/slide9.xml><?xml version="1.0" encoding="utf-8"?>
 <p:sld xmlns:a="http://schemas.openxmlformats.org/drawingml/2006/main" xmlns:r="http://schemas.openxmlformats.org/officeDocument/2006/relationships" xmlns:p="http://schemas.openxmlformats.org/presentationml/2006/main">
   <p:cSld>
     <p:spTree>

</xml_diff>

<commit_message>
corrrigiendo problemas de marge
</commit_message>
<xml_diff>
--- a/tarea/Diagrama de Pareto.pptx
+++ b/tarea/Diagrama de Pareto.pptx
@@ -7,11 +7,13 @@
   <p:sldIdLst>
     <p:sldId id="256" r:id="rId2"/>
     <p:sldId id="257" r:id="rId3"/>
-    <p:sldId id="262" r:id="rId4"/>
-    <p:sldId id="258" r:id="rId5"/>
-    <p:sldId id="259" r:id="rId6"/>
-    <p:sldId id="260" r:id="rId7"/>
-    <p:sldId id="261" r:id="rId8"/>
+    <p:sldId id="258" r:id="rId4"/>
+    <p:sldId id="259" r:id="rId5"/>
+    <p:sldId id="262" r:id="rId6"/>
+    <p:sldId id="263" r:id="rId7"/>
+    <p:sldId id="264" r:id="rId8"/>
+    <p:sldId id="260" r:id="rId9"/>
+    <p:sldId id="261" r:id="rId10"/>
   </p:sldIdLst>
   <p:sldSz cx="9144000" cy="6858000" type="screen4x3"/>
   <p:notesSz cx="6858000" cy="9144000"/>
@@ -110,6 +112,22 @@
       </a:defRPr>
     </a:lvl9pPr>
   </p:defaultTextStyle>
+  <p:extLst>
+    <p:ext uri="{EFAFB233-063F-42B5-8137-9DF3F51BA10A}">
+      <p15:sldGuideLst xmlns:p15="http://schemas.microsoft.com/office/powerpoint/2012/main">
+        <p15:guide id="1" orient="horz" pos="2160">
+          <p15:clr>
+            <a:srgbClr val="A4A3A4"/>
+          </p15:clr>
+        </p15:guide>
+        <p15:guide id="2" pos="2880">
+          <p15:clr>
+            <a:srgbClr val="A4A3A4"/>
+          </p15:clr>
+        </p15:guide>
+      </p15:sldGuideLst>
+    </p:ext>
+  </p:extLst>
 </p:presentation>
 </file>
 
@@ -393,7 +411,7 @@
           <a:p>
             <a:fld id="{16DB4BCF-0BF3-4385-8ABA-E98DB5C1E267}" type="datetimeFigureOut">
               <a:rPr lang="es-MX" smtClean="0"/>
-              <a:t>17/04/2015</a:t>
+              <a:t>21/04/2015</a:t>
             </a:fld>
             <a:endParaRPr lang="es-MX"/>
           </a:p>
@@ -786,7 +804,7 @@
           <a:p>
             <a:fld id="{16DB4BCF-0BF3-4385-8ABA-E98DB5C1E267}" type="datetimeFigureOut">
               <a:rPr lang="es-MX" smtClean="0"/>
-              <a:t>17/04/2015</a:t>
+              <a:t>21/04/2015</a:t>
             </a:fld>
             <a:endParaRPr lang="es-MX"/>
           </a:p>
@@ -1318,7 +1336,7 @@
           <a:p>
             <a:fld id="{16DB4BCF-0BF3-4385-8ABA-E98DB5C1E267}" type="datetimeFigureOut">
               <a:rPr lang="es-MX" smtClean="0"/>
-              <a:t>17/04/2015</a:t>
+              <a:t>21/04/2015</a:t>
             </a:fld>
             <a:endParaRPr lang="es-MX"/>
           </a:p>
@@ -1451,7 +1469,7 @@
           <a:p>
             <a:fld id="{16DB4BCF-0BF3-4385-8ABA-E98DB5C1E267}" type="datetimeFigureOut">
               <a:rPr lang="es-MX" smtClean="0"/>
-              <a:t>17/04/2015</a:t>
+              <a:t>21/04/2015</a:t>
             </a:fld>
             <a:endParaRPr lang="es-MX"/>
           </a:p>
@@ -1994,7 +2012,7 @@
           <a:p>
             <a:fld id="{16DB4BCF-0BF3-4385-8ABA-E98DB5C1E267}" type="datetimeFigureOut">
               <a:rPr lang="es-MX" smtClean="0"/>
-              <a:t>17/04/2015</a:t>
+              <a:t>21/04/2015</a:t>
             </a:fld>
             <a:endParaRPr lang="es-MX"/>
           </a:p>
@@ -2289,7 +2307,7 @@
           <a:p>
             <a:fld id="{16DB4BCF-0BF3-4385-8ABA-E98DB5C1E267}" type="datetimeFigureOut">
               <a:rPr lang="es-MX" smtClean="0"/>
-              <a:t>17/04/2015</a:t>
+              <a:t>21/04/2015</a:t>
             </a:fld>
             <a:endParaRPr lang="es-MX"/>
           </a:p>
@@ -2948,7 +2966,7 @@
           <a:p>
             <a:fld id="{16DB4BCF-0BF3-4385-8ABA-E98DB5C1E267}" type="datetimeFigureOut">
               <a:rPr lang="es-MX" smtClean="0"/>
-              <a:t>17/04/2015</a:t>
+              <a:t>21/04/2015</a:t>
             </a:fld>
             <a:endParaRPr lang="es-MX"/>
           </a:p>
@@ -3384,7 +3402,7 @@
           <a:p>
             <a:fld id="{16DB4BCF-0BF3-4385-8ABA-E98DB5C1E267}" type="datetimeFigureOut">
               <a:rPr lang="es-MX" smtClean="0"/>
-              <a:t>17/04/2015</a:t>
+              <a:t>21/04/2015</a:t>
             </a:fld>
             <a:endParaRPr lang="es-MX"/>
           </a:p>
@@ -3697,7 +3715,7 @@
           <a:p>
             <a:fld id="{16DB4BCF-0BF3-4385-8ABA-E98DB5C1E267}" type="datetimeFigureOut">
               <a:rPr lang="es-MX" smtClean="0"/>
-              <a:t>17/04/2015</a:t>
+              <a:t>21/04/2015</a:t>
             </a:fld>
             <a:endParaRPr lang="es-MX"/>
           </a:p>
@@ -4429,7 +4447,7 @@
           <a:p>
             <a:fld id="{16DB4BCF-0BF3-4385-8ABA-E98DB5C1E267}" type="datetimeFigureOut">
               <a:rPr lang="es-MX" smtClean="0"/>
-              <a:t>17/04/2015</a:t>
+              <a:t>21/04/2015</a:t>
             </a:fld>
             <a:endParaRPr lang="es-MX"/>
           </a:p>
@@ -5093,7 +5111,7 @@
           <a:p>
             <a:fld id="{16DB4BCF-0BF3-4385-8ABA-E98DB5C1E267}" type="datetimeFigureOut">
               <a:rPr lang="es-MX" smtClean="0"/>
-              <a:t>17/04/2015</a:t>
+              <a:t>21/04/2015</a:t>
             </a:fld>
             <a:endParaRPr lang="es-MX"/>
           </a:p>
@@ -5366,7 +5384,7 @@
           <a:p>
             <a:fld id="{16DB4BCF-0BF3-4385-8ABA-E98DB5C1E267}" type="datetimeFigureOut">
               <a:rPr lang="es-MX" smtClean="0"/>
-              <a:t>17/04/2015</a:t>
+              <a:t>21/04/2015</a:t>
             </a:fld>
             <a:endParaRPr lang="es-MX"/>
           </a:p>
@@ -6314,7 +6332,7 @@
           <a:p>
             <a:r>
               <a:rPr lang="es-MX" dirty="0" smtClean="0"/>
-              <a:t>Usos </a:t>
+              <a:t>Ingeniería de Software </a:t>
             </a:r>
             <a:endParaRPr lang="es-MX" dirty="0"/>
           </a:p>
@@ -6335,27 +6353,12 @@
           <a:bodyPr/>
           <a:lstStyle/>
           <a:p>
+            <a:endParaRPr lang="es-MX" dirty="0" smtClean="0"/>
+          </a:p>
+          <a:p>
             <a:r>
               <a:rPr lang="es-MX" dirty="0" smtClean="0"/>
-              <a:t>Determinar causa de los problemas.</a:t>
-            </a:r>
-          </a:p>
-          <a:p>
-            <a:endParaRPr lang="es-MX" dirty="0" smtClean="0"/>
-          </a:p>
-          <a:p>
-            <a:r>
-              <a:rPr lang="es-MX" dirty="0" smtClean="0"/>
-              <a:t>Factores mas importantes de un problema.</a:t>
-            </a:r>
-          </a:p>
-          <a:p>
-            <a:endParaRPr lang="es-MX" dirty="0" smtClean="0"/>
-          </a:p>
-          <a:p>
-            <a:r>
-              <a:rPr lang="es-MX" dirty="0" smtClean="0"/>
-              <a:t>Decidir el objetivo de mejora y los elementos a mejorar.</a:t>
+              <a:t>El 80 % del esfuerzo de desarrollo (en tiempo y recursos) produce el 20 % del código, mientras que el 80 % restante es producido con tan solo un 20 % del esfuerzo.</a:t>
             </a:r>
             <a:endParaRPr lang="es-MX" dirty="0"/>
           </a:p>
@@ -6364,13 +6367,20 @@
     </p:spTree>
     <p:extLst>
       <p:ext uri="{BB962C8B-B14F-4D97-AF65-F5344CB8AC3E}">
-        <p14:creationId xmlns:p14="http://schemas.microsoft.com/office/powerpoint/2010/main" val="924261272"/>
+        <p14:creationId xmlns:p14="http://schemas.microsoft.com/office/powerpoint/2010/main" val="527068628"/>
       </p:ext>
     </p:extLst>
   </p:cSld>
   <p:clrMapOvr>
     <a:masterClrMapping/>
   </p:clrMapOvr>
+  <p:timing>
+    <p:tnLst>
+      <p:par>
+        <p:cTn id="1" dur="indefinite" restart="never" nodeType="tmRoot"/>
+      </p:par>
+    </p:tnLst>
+  </p:timing>
 </p:sld>
 </file>
 
@@ -6408,7 +6418,7 @@
           <a:p>
             <a:r>
               <a:rPr lang="es-MX" dirty="0" smtClean="0"/>
-              <a:t>Ingeniería de Software </a:t>
+              <a:t>Pruebas de Software</a:t>
             </a:r>
             <a:endParaRPr lang="es-MX" dirty="0"/>
           </a:p>
@@ -6434,7 +6444,7 @@
           <a:p>
             <a:r>
               <a:rPr lang="es-MX" dirty="0" smtClean="0"/>
-              <a:t>El 80 % del esfuerzo de desarrollo (en tiempo y recursos) produce el 20 % del código, mientras que el 80 % restante es producido con tan solo un 20 % del esfuerzo.</a:t>
+              <a:t>El principio nos dice que "el 80 % de los fallos de un software es generado por un 20 % del código de dicho software, mientras que el otro 80 % genera tan solo un 20 % de los fallos".</a:t>
             </a:r>
             <a:endParaRPr lang="es-MX" dirty="0"/>
           </a:p>
@@ -6443,7 +6453,7 @@
     </p:spTree>
     <p:extLst>
       <p:ext uri="{BB962C8B-B14F-4D97-AF65-F5344CB8AC3E}">
-        <p14:creationId xmlns:p14="http://schemas.microsoft.com/office/powerpoint/2010/main" val="527068628"/>
+        <p14:creationId xmlns:p14="http://schemas.microsoft.com/office/powerpoint/2010/main" val="773527355"/>
       </p:ext>
     </p:extLst>
   </p:cSld>
@@ -6479,7 +6489,7 @@
       </p:grpSpPr>
       <p:sp>
         <p:nvSpPr>
-          <p:cNvPr id="2" name="1 Título"/>
+          <p:cNvPr id="2" name="Título 1"/>
           <p:cNvSpPr>
             <a:spLocks noGrp="1"/>
           </p:cNvSpPr>
@@ -6492,36 +6502,53 @@
           <a:bodyPr/>
           <a:lstStyle/>
           <a:p>
+            <a:endParaRPr lang="es-MX"/>
+          </a:p>
+        </p:txBody>
+      </p:sp>
+      <p:sp>
+        <p:nvSpPr>
+          <p:cNvPr id="3" name="Marcador de contenido 2"/>
+          <p:cNvSpPr>
+            <a:spLocks noGrp="1"/>
+          </p:cNvSpPr>
+          <p:nvPr>
+            <p:ph sz="quarter" idx="1"/>
+          </p:nvPr>
+        </p:nvSpPr>
+        <p:spPr/>
+        <p:txBody>
+          <a:bodyPr/>
+          <a:lstStyle/>
+          <a:p>
+            <a:r>
+              <a:rPr lang="es-MX" dirty="0"/>
+              <a:t>Las Tablas y Diagramas de Pareto son herramientas de representación </a:t>
+            </a:r>
             <a:r>
               <a:rPr lang="es-MX" dirty="0" smtClean="0"/>
-              <a:t>Pruebas de Software</a:t>
-            </a:r>
-            <a:endParaRPr lang="es-MX" dirty="0"/>
-          </a:p>
-        </p:txBody>
-      </p:sp>
-      <p:sp>
-        <p:nvSpPr>
-          <p:cNvPr id="3" name="2 Marcador de contenido"/>
-          <p:cNvSpPr>
-            <a:spLocks noGrp="1"/>
-          </p:cNvSpPr>
-          <p:nvPr>
-            <p:ph sz="quarter" idx="1"/>
-          </p:nvPr>
-        </p:nvSpPr>
-        <p:spPr/>
-        <p:txBody>
-          <a:bodyPr/>
-          <a:lstStyle/>
-          <a:p>
-            <a:endParaRPr lang="es-MX" dirty="0" smtClean="0"/>
-          </a:p>
-          <a:p>
+              <a:t>utilizadas para </a:t>
+            </a:r>
+            <a:r>
+              <a:rPr lang="es-MX" dirty="0"/>
+              <a:t>visualizar el Análisis de Pareto.</a:t>
+            </a:r>
+          </a:p>
+          <a:p>
+            <a:r>
+              <a:rPr lang="es-MX" dirty="0"/>
+              <a:t>El Diagrama de Pareto es la representación gráfica de la Tabla de </a:t>
+            </a:r>
             <a:r>
               <a:rPr lang="es-MX" dirty="0" smtClean="0"/>
-              <a:t>El principio nos dice que "el 80 % de los fallos de un software es generado por un 20 % del código de dicho software, mientras que el otro 80 % genera tan solo un 20 % de los fallos".</a:t>
-            </a:r>
+              <a:t>Pareto correspondiente</a:t>
+            </a:r>
+            <a:r>
+              <a:rPr lang="es-MX" dirty="0"/>
+              <a:t>.</a:t>
+            </a:r>
+          </a:p>
+          <a:p>
             <a:endParaRPr lang="es-MX" dirty="0"/>
           </a:p>
         </p:txBody>
@@ -6529,24 +6556,843 @@
     </p:spTree>
     <p:extLst>
       <p:ext uri="{BB962C8B-B14F-4D97-AF65-F5344CB8AC3E}">
-        <p14:creationId xmlns:p14="http://schemas.microsoft.com/office/powerpoint/2010/main" val="773527355"/>
+        <p14:creationId xmlns:p14="http://schemas.microsoft.com/office/powerpoint/2010/main" val="601317714"/>
       </p:ext>
     </p:extLst>
   </p:cSld>
   <p:clrMapOvr>
     <a:masterClrMapping/>
   </p:clrMapOvr>
-  <p:timing>
-    <p:tnLst>
-      <p:par>
-        <p:cTn id="1" dur="indefinite" restart="never" nodeType="tmRoot"/>
-      </p:par>
-    </p:tnLst>
-  </p:timing>
 </p:sld>
 </file>
 
 <file path=ppt/slides/slide6.xml><?xml version="1.0" encoding="utf-8"?>
+<p:sld xmlns:a="http://schemas.openxmlformats.org/drawingml/2006/main" xmlns:r="http://schemas.openxmlformats.org/officeDocument/2006/relationships" xmlns:p="http://schemas.openxmlformats.org/presentationml/2006/main">
+  <p:cSld>
+    <p:spTree>
+      <p:nvGrpSpPr>
+        <p:cNvPr id="1" name=""/>
+        <p:cNvGrpSpPr/>
+        <p:nvPr/>
+      </p:nvGrpSpPr>
+      <p:grpSpPr>
+        <a:xfrm>
+          <a:off x="0" y="0"/>
+          <a:ext cx="0" cy="0"/>
+          <a:chOff x="0" y="0"/>
+          <a:chExt cx="0" cy="0"/>
+        </a:xfrm>
+      </p:grpSpPr>
+      <p:sp>
+        <p:nvSpPr>
+          <p:cNvPr id="2" name="Título 1"/>
+          <p:cNvSpPr>
+            <a:spLocks noGrp="1"/>
+          </p:cNvSpPr>
+          <p:nvPr>
+            <p:ph type="title"/>
+          </p:nvPr>
+        </p:nvSpPr>
+        <p:spPr/>
+        <p:txBody>
+          <a:bodyPr/>
+          <a:lstStyle/>
+          <a:p>
+            <a:r>
+              <a:rPr lang="es-MX" dirty="0"/>
+              <a:t>Características principales </a:t>
+            </a:r>
+          </a:p>
+        </p:txBody>
+      </p:sp>
+      <p:sp>
+        <p:nvSpPr>
+          <p:cNvPr id="3" name="Marcador de contenido 2"/>
+          <p:cNvSpPr>
+            <a:spLocks noGrp="1"/>
+          </p:cNvSpPr>
+          <p:nvPr>
+            <p:ph sz="quarter" idx="1"/>
+          </p:nvPr>
+        </p:nvSpPr>
+        <p:spPr/>
+        <p:txBody>
+          <a:bodyPr/>
+          <a:lstStyle/>
+          <a:p>
+            <a:r>
+              <a:rPr lang="es-MX" dirty="0" smtClean="0"/>
+              <a:t>Simplicidad: </a:t>
+            </a:r>
+            <a:r>
+              <a:rPr lang="es-MX" dirty="0"/>
+              <a:t>Tanto la Tabla como el Diagrama de Pareto no requieren ni cálculos complejos ni técnicas sofisticadas de representación gráfica. </a:t>
+            </a:r>
+            <a:endParaRPr lang="es-MX" dirty="0" smtClean="0"/>
+          </a:p>
+          <a:p>
+            <a:r>
+              <a:rPr lang="es-MX" dirty="0" smtClean="0"/>
+              <a:t>Impacto visual: </a:t>
+            </a:r>
+            <a:r>
+              <a:rPr lang="es-MX" dirty="0"/>
+              <a:t>El Diagrama de Pareto comunica de forma clara, evidente y de un "vistazo", el resultado del análisis de comparación y priorización.</a:t>
+            </a:r>
+          </a:p>
+        </p:txBody>
+      </p:sp>
+    </p:spTree>
+    <p:extLst>
+      <p:ext uri="{BB962C8B-B14F-4D97-AF65-F5344CB8AC3E}">
+        <p14:creationId xmlns:p14="http://schemas.microsoft.com/office/powerpoint/2010/main" val="2699632386"/>
+      </p:ext>
+    </p:extLst>
+  </p:cSld>
+  <p:clrMapOvr>
+    <a:masterClrMapping/>
+  </p:clrMapOvr>
+</p:sld>
+</file>
+
+<file path=ppt/slides/slide7.xml><?xml version="1.0" encoding="utf-8"?>
+<p:sld xmlns:a="http://schemas.openxmlformats.org/drawingml/2006/main" xmlns:r="http://schemas.openxmlformats.org/officeDocument/2006/relationships" xmlns:p="http://schemas.openxmlformats.org/presentationml/2006/main">
+  <p:cSld>
+    <p:spTree>
+      <p:nvGrpSpPr>
+        <p:cNvPr id="1" name=""/>
+        <p:cNvGrpSpPr/>
+        <p:nvPr/>
+      </p:nvGrpSpPr>
+      <p:grpSpPr>
+        <a:xfrm>
+          <a:off x="0" y="0"/>
+          <a:ext cx="0" cy="0"/>
+          <a:chOff x="0" y="0"/>
+          <a:chExt cx="0" cy="0"/>
+        </a:xfrm>
+      </p:grpSpPr>
+      <p:sp>
+        <p:nvSpPr>
+          <p:cNvPr id="2" name="Título 1"/>
+          <p:cNvSpPr>
+            <a:spLocks noGrp="1"/>
+          </p:cNvSpPr>
+          <p:nvPr>
+            <p:ph type="title"/>
+          </p:nvPr>
+        </p:nvSpPr>
+        <p:spPr>
+          <a:xfrm>
+            <a:off x="286512" y="404664"/>
+            <a:ext cx="8534400" cy="758952"/>
+          </a:xfrm>
+        </p:spPr>
+        <p:txBody>
+          <a:bodyPr>
+            <a:normAutofit fontScale="90000"/>
+          </a:bodyPr>
+          <a:lstStyle/>
+          <a:p>
+            <a:r>
+              <a:rPr lang="es-MX" b="1" dirty="0" smtClean="0"/>
+              <a:t/>
+            </a:r>
+            <a:br>
+              <a:rPr lang="es-MX" b="1" dirty="0" smtClean="0"/>
+            </a:br>
+            <a:r>
+              <a:rPr lang="es-MX" b="1" dirty="0"/>
+              <a:t/>
+            </a:r>
+            <a:br>
+              <a:rPr lang="es-MX" b="1" dirty="0"/>
+            </a:br>
+            <a:r>
+              <a:rPr lang="es-MX" b="1" dirty="0" smtClean="0"/>
+              <a:t/>
+            </a:r>
+            <a:br>
+              <a:rPr lang="es-MX" b="1" dirty="0" smtClean="0"/>
+            </a:br>
+            <a:r>
+              <a:rPr lang="es-MX" b="1" dirty="0"/>
+              <a:t/>
+            </a:r>
+            <a:br>
+              <a:rPr lang="es-MX" b="1" dirty="0"/>
+            </a:br>
+            <a:r>
+              <a:rPr lang="es-MX" b="1" dirty="0" smtClean="0"/>
+              <a:t/>
+            </a:r>
+            <a:br>
+              <a:rPr lang="es-MX" b="1" dirty="0" smtClean="0"/>
+            </a:br>
+            <a:r>
+              <a:rPr lang="es-MX" b="1" dirty="0"/>
+              <a:t/>
+            </a:r>
+            <a:br>
+              <a:rPr lang="es-MX" b="1" dirty="0"/>
+            </a:br>
+            <a:r>
+              <a:rPr lang="es-MX" b="1" dirty="0" smtClean="0"/>
+              <a:t/>
+            </a:r>
+            <a:br>
+              <a:rPr lang="es-MX" b="1" dirty="0" smtClean="0"/>
+            </a:br>
+            <a:r>
+              <a:rPr lang="es-MX" b="1" dirty="0"/>
+              <a:t/>
+            </a:r>
+            <a:br>
+              <a:rPr lang="es-MX" b="1" dirty="0"/>
+            </a:br>
+            <a:r>
+              <a:rPr lang="es-MX" b="1" dirty="0" smtClean="0"/>
+              <a:t/>
+            </a:r>
+            <a:br>
+              <a:rPr lang="es-MX" b="1" dirty="0" smtClean="0"/>
+            </a:br>
+            <a:r>
+              <a:rPr lang="es-MX" b="1" dirty="0"/>
+              <a:t/>
+            </a:r>
+            <a:br>
+              <a:rPr lang="es-MX" b="1" dirty="0"/>
+            </a:br>
+            <a:r>
+              <a:rPr lang="es-MX" b="1" dirty="0" smtClean="0"/>
+              <a:t/>
+            </a:r>
+            <a:br>
+              <a:rPr lang="es-MX" b="1" dirty="0" smtClean="0"/>
+            </a:br>
+            <a:r>
+              <a:rPr lang="es-MX" b="1" dirty="0"/>
+              <a:t/>
+            </a:r>
+            <a:br>
+              <a:rPr lang="es-MX" b="1" dirty="0"/>
+            </a:br>
+            <a:r>
+              <a:rPr lang="es-MX" b="1" dirty="0" smtClean="0"/>
+              <a:t/>
+            </a:r>
+            <a:br>
+              <a:rPr lang="es-MX" b="1" dirty="0" smtClean="0"/>
+            </a:br>
+            <a:r>
+              <a:rPr lang="es-MX" b="1" dirty="0"/>
+              <a:t/>
+            </a:r>
+            <a:br>
+              <a:rPr lang="es-MX" b="1" dirty="0"/>
+            </a:br>
+            <a:r>
+              <a:rPr lang="es-MX" b="1" dirty="0" smtClean="0"/>
+              <a:t/>
+            </a:r>
+            <a:br>
+              <a:rPr lang="es-MX" b="1" dirty="0" smtClean="0"/>
+            </a:br>
+            <a:r>
+              <a:rPr lang="es-MX" b="1" dirty="0"/>
+              <a:t/>
+            </a:r>
+            <a:br>
+              <a:rPr lang="es-MX" b="1" dirty="0"/>
+            </a:br>
+            <a:r>
+              <a:rPr lang="es-MX" b="1" dirty="0" smtClean="0"/>
+              <a:t/>
+            </a:r>
+            <a:br>
+              <a:rPr lang="es-MX" b="1" dirty="0" smtClean="0"/>
+            </a:br>
+            <a:r>
+              <a:rPr lang="es-MX" b="1" dirty="0"/>
+              <a:t/>
+            </a:r>
+            <a:br>
+              <a:rPr lang="es-MX" b="1" dirty="0"/>
+            </a:br>
+            <a:r>
+              <a:rPr lang="es-MX" b="1" dirty="0" smtClean="0"/>
+              <a:t/>
+            </a:r>
+            <a:br>
+              <a:rPr lang="es-MX" b="1" dirty="0" smtClean="0"/>
+            </a:br>
+            <a:r>
+              <a:rPr lang="es-MX" b="1" dirty="0"/>
+              <a:t/>
+            </a:r>
+            <a:br>
+              <a:rPr lang="es-MX" b="1" dirty="0"/>
+            </a:br>
+            <a:r>
+              <a:rPr lang="es-MX" b="1" dirty="0" smtClean="0"/>
+              <a:t/>
+            </a:r>
+            <a:br>
+              <a:rPr lang="es-MX" b="1" dirty="0" smtClean="0"/>
+            </a:br>
+            <a:r>
+              <a:rPr lang="es-MX" b="1" dirty="0"/>
+              <a:t/>
+            </a:r>
+            <a:br>
+              <a:rPr lang="es-MX" b="1" dirty="0"/>
+            </a:br>
+            <a:r>
+              <a:rPr lang="es-MX" b="1" dirty="0" smtClean="0"/>
+              <a:t/>
+            </a:r>
+            <a:br>
+              <a:rPr lang="es-MX" b="1" dirty="0" smtClean="0"/>
+            </a:br>
+            <a:r>
+              <a:rPr lang="es-MX" b="1" dirty="0"/>
+              <a:t/>
+            </a:r>
+            <a:br>
+              <a:rPr lang="es-MX" b="1" dirty="0"/>
+            </a:br>
+            <a:r>
+              <a:rPr lang="es-MX" b="1" dirty="0" smtClean="0"/>
+              <a:t/>
+            </a:r>
+            <a:br>
+              <a:rPr lang="es-MX" b="1" dirty="0" smtClean="0"/>
+            </a:br>
+            <a:r>
+              <a:rPr lang="es-MX" b="1" dirty="0"/>
+              <a:t/>
+            </a:r>
+            <a:br>
+              <a:rPr lang="es-MX" b="1" dirty="0"/>
+            </a:br>
+            <a:r>
+              <a:rPr lang="es-MX" b="1" dirty="0" smtClean="0"/>
+              <a:t/>
+            </a:r>
+            <a:br>
+              <a:rPr lang="es-MX" b="1" dirty="0" smtClean="0"/>
+            </a:br>
+            <a:r>
+              <a:rPr lang="es-MX" b="1" dirty="0"/>
+              <a:t/>
+            </a:r>
+            <a:br>
+              <a:rPr lang="es-MX" b="1" dirty="0"/>
+            </a:br>
+            <a:r>
+              <a:rPr lang="es-MX" b="1" dirty="0" smtClean="0"/>
+              <a:t/>
+            </a:r>
+            <a:br>
+              <a:rPr lang="es-MX" b="1" dirty="0" smtClean="0"/>
+            </a:br>
+            <a:r>
+              <a:rPr lang="es-MX" b="1" dirty="0"/>
+              <a:t/>
+            </a:r>
+            <a:br>
+              <a:rPr lang="es-MX" b="1" dirty="0"/>
+            </a:br>
+            <a:r>
+              <a:rPr lang="es-MX" b="1" dirty="0" smtClean="0"/>
+              <a:t/>
+            </a:r>
+            <a:br>
+              <a:rPr lang="es-MX" b="1" dirty="0" smtClean="0"/>
+            </a:br>
+            <a:r>
+              <a:rPr lang="es-MX" b="1" dirty="0"/>
+              <a:t/>
+            </a:r>
+            <a:br>
+              <a:rPr lang="es-MX" b="1" dirty="0"/>
+            </a:br>
+            <a:r>
+              <a:rPr lang="es-MX" b="1" dirty="0" smtClean="0"/>
+              <a:t/>
+            </a:r>
+            <a:br>
+              <a:rPr lang="es-MX" b="1" dirty="0" smtClean="0"/>
+            </a:br>
+            <a:r>
+              <a:rPr lang="es-MX" b="1" dirty="0"/>
+              <a:t/>
+            </a:r>
+            <a:br>
+              <a:rPr lang="es-MX" b="1" dirty="0"/>
+            </a:br>
+            <a:r>
+              <a:rPr lang="es-MX" b="1" dirty="0" smtClean="0"/>
+              <a:t/>
+            </a:r>
+            <a:br>
+              <a:rPr lang="es-MX" b="1" dirty="0" smtClean="0"/>
+            </a:br>
+            <a:r>
+              <a:rPr lang="es-MX" b="1" dirty="0"/>
+              <a:t/>
+            </a:r>
+            <a:br>
+              <a:rPr lang="es-MX" b="1" dirty="0"/>
+            </a:br>
+            <a:r>
+              <a:rPr lang="es-MX" b="1" dirty="0" smtClean="0"/>
+              <a:t/>
+            </a:r>
+            <a:br>
+              <a:rPr lang="es-MX" b="1" dirty="0" smtClean="0"/>
+            </a:br>
+            <a:r>
+              <a:rPr lang="es-MX" b="1" dirty="0"/>
+              <a:t/>
+            </a:r>
+            <a:br>
+              <a:rPr lang="es-MX" b="1" dirty="0"/>
+            </a:br>
+            <a:r>
+              <a:rPr lang="es-MX" b="1" dirty="0" smtClean="0"/>
+              <a:t/>
+            </a:r>
+            <a:br>
+              <a:rPr lang="es-MX" b="1" dirty="0" smtClean="0"/>
+            </a:br>
+            <a:r>
+              <a:rPr lang="es-MX" b="1" dirty="0"/>
+              <a:t/>
+            </a:r>
+            <a:br>
+              <a:rPr lang="es-MX" b="1" dirty="0"/>
+            </a:br>
+            <a:r>
+              <a:rPr lang="es-MX" b="1" dirty="0" smtClean="0"/>
+              <a:t/>
+            </a:r>
+            <a:br>
+              <a:rPr lang="es-MX" b="1" dirty="0" smtClean="0"/>
+            </a:br>
+            <a:r>
+              <a:rPr lang="es-MX" b="1" dirty="0"/>
+              <a:t/>
+            </a:r>
+            <a:br>
+              <a:rPr lang="es-MX" b="1" dirty="0"/>
+            </a:br>
+            <a:r>
+              <a:rPr lang="es-MX" b="1" dirty="0" smtClean="0"/>
+              <a:t/>
+            </a:r>
+            <a:br>
+              <a:rPr lang="es-MX" b="1" dirty="0" smtClean="0"/>
+            </a:br>
+            <a:r>
+              <a:rPr lang="es-MX" b="1" dirty="0"/>
+              <a:t/>
+            </a:r>
+            <a:br>
+              <a:rPr lang="es-MX" b="1" dirty="0"/>
+            </a:br>
+            <a:r>
+              <a:rPr lang="es-MX" b="1" dirty="0" smtClean="0"/>
+              <a:t/>
+            </a:r>
+            <a:br>
+              <a:rPr lang="es-MX" b="1" dirty="0" smtClean="0"/>
+            </a:br>
+            <a:r>
+              <a:rPr lang="es-MX" b="1" dirty="0"/>
+              <a:t/>
+            </a:r>
+            <a:br>
+              <a:rPr lang="es-MX" b="1" dirty="0"/>
+            </a:br>
+            <a:r>
+              <a:rPr lang="es-MX" b="1" dirty="0" smtClean="0"/>
+              <a:t/>
+            </a:r>
+            <a:br>
+              <a:rPr lang="es-MX" b="1" dirty="0" smtClean="0"/>
+            </a:br>
+            <a:r>
+              <a:rPr lang="es-MX" b="1" dirty="0"/>
+              <a:t/>
+            </a:r>
+            <a:br>
+              <a:rPr lang="es-MX" b="1" dirty="0"/>
+            </a:br>
+            <a:r>
+              <a:rPr lang="es-MX" b="1" dirty="0" smtClean="0"/>
+              <a:t/>
+            </a:r>
+            <a:br>
+              <a:rPr lang="es-MX" b="1" dirty="0" smtClean="0"/>
+            </a:br>
+            <a:r>
+              <a:rPr lang="es-MX" b="1" dirty="0"/>
+              <a:t/>
+            </a:r>
+            <a:br>
+              <a:rPr lang="es-MX" b="1" dirty="0"/>
+            </a:br>
+            <a:r>
+              <a:rPr lang="es-MX" b="1" dirty="0" smtClean="0"/>
+              <a:t/>
+            </a:r>
+            <a:br>
+              <a:rPr lang="es-MX" b="1" dirty="0" smtClean="0"/>
+            </a:br>
+            <a:r>
+              <a:rPr lang="es-MX" b="1" dirty="0"/>
+              <a:t/>
+            </a:r>
+            <a:br>
+              <a:rPr lang="es-MX" b="1" dirty="0"/>
+            </a:br>
+            <a:r>
+              <a:rPr lang="es-MX" b="1" dirty="0" smtClean="0"/>
+              <a:t/>
+            </a:r>
+            <a:br>
+              <a:rPr lang="es-MX" b="1" dirty="0" smtClean="0"/>
+            </a:br>
+            <a:r>
+              <a:rPr lang="es-MX" b="1" dirty="0"/>
+              <a:t/>
+            </a:r>
+            <a:br>
+              <a:rPr lang="es-MX" b="1" dirty="0"/>
+            </a:br>
+            <a:r>
+              <a:rPr lang="es-MX" b="1" dirty="0" smtClean="0"/>
+              <a:t/>
+            </a:r>
+            <a:br>
+              <a:rPr lang="es-MX" b="1" dirty="0" smtClean="0"/>
+            </a:br>
+            <a:r>
+              <a:rPr lang="es-MX" b="1" dirty="0"/>
+              <a:t/>
+            </a:r>
+            <a:br>
+              <a:rPr lang="es-MX" b="1" dirty="0"/>
+            </a:br>
+            <a:r>
+              <a:rPr lang="es-MX" b="1" dirty="0" smtClean="0"/>
+              <a:t/>
+            </a:r>
+            <a:br>
+              <a:rPr lang="es-MX" b="1" dirty="0" smtClean="0"/>
+            </a:br>
+            <a:r>
+              <a:rPr lang="es-MX" b="1" dirty="0"/>
+              <a:t/>
+            </a:r>
+            <a:br>
+              <a:rPr lang="es-MX" b="1" dirty="0"/>
+            </a:br>
+            <a:r>
+              <a:rPr lang="es-MX" b="1" dirty="0" smtClean="0"/>
+              <a:t/>
+            </a:r>
+            <a:br>
+              <a:rPr lang="es-MX" b="1" dirty="0" smtClean="0"/>
+            </a:br>
+            <a:r>
+              <a:rPr lang="es-MX" b="1" dirty="0"/>
+              <a:t/>
+            </a:r>
+            <a:br>
+              <a:rPr lang="es-MX" b="1" dirty="0"/>
+            </a:br>
+            <a:r>
+              <a:rPr lang="es-MX" b="1" dirty="0" smtClean="0"/>
+              <a:t/>
+            </a:r>
+            <a:br>
+              <a:rPr lang="es-MX" b="1" dirty="0" smtClean="0"/>
+            </a:br>
+            <a:r>
+              <a:rPr lang="es-MX" b="1" dirty="0"/>
+              <a:t/>
+            </a:r>
+            <a:br>
+              <a:rPr lang="es-MX" b="1" dirty="0"/>
+            </a:br>
+            <a:r>
+              <a:rPr lang="es-MX" b="1" dirty="0" smtClean="0"/>
+              <a:t/>
+            </a:r>
+            <a:br>
+              <a:rPr lang="es-MX" b="1" dirty="0" smtClean="0"/>
+            </a:br>
+            <a:r>
+              <a:rPr lang="es-MX" b="1" dirty="0"/>
+              <a:t/>
+            </a:r>
+            <a:br>
+              <a:rPr lang="es-MX" b="1" dirty="0"/>
+            </a:br>
+            <a:r>
+              <a:rPr lang="es-MX" b="1" dirty="0" smtClean="0"/>
+              <a:t/>
+            </a:r>
+            <a:br>
+              <a:rPr lang="es-MX" b="1" dirty="0" smtClean="0"/>
+            </a:br>
+            <a:r>
+              <a:rPr lang="es-MX" b="1" dirty="0"/>
+              <a:t/>
+            </a:r>
+            <a:br>
+              <a:rPr lang="es-MX" b="1" dirty="0"/>
+            </a:br>
+            <a:r>
+              <a:rPr lang="es-MX" b="1" dirty="0" smtClean="0"/>
+              <a:t/>
+            </a:r>
+            <a:br>
+              <a:rPr lang="es-MX" b="1" dirty="0" smtClean="0"/>
+            </a:br>
+            <a:r>
+              <a:rPr lang="es-MX" b="1" dirty="0"/>
+              <a:t/>
+            </a:r>
+            <a:br>
+              <a:rPr lang="es-MX" b="1" dirty="0"/>
+            </a:br>
+            <a:r>
+              <a:rPr lang="es-MX" b="1" dirty="0" smtClean="0"/>
+              <a:t/>
+            </a:r>
+            <a:br>
+              <a:rPr lang="es-MX" b="1" dirty="0" smtClean="0"/>
+            </a:br>
+            <a:r>
+              <a:rPr lang="es-MX" b="1" dirty="0"/>
+              <a:t/>
+            </a:r>
+            <a:br>
+              <a:rPr lang="es-MX" b="1" dirty="0"/>
+            </a:br>
+            <a:r>
+              <a:rPr lang="es-MX" b="1" dirty="0" smtClean="0"/>
+              <a:t/>
+            </a:r>
+            <a:br>
+              <a:rPr lang="es-MX" b="1" dirty="0" smtClean="0"/>
+            </a:br>
+            <a:r>
+              <a:rPr lang="es-MX" b="1" dirty="0"/>
+              <a:t/>
+            </a:r>
+            <a:br>
+              <a:rPr lang="es-MX" b="1" dirty="0"/>
+            </a:br>
+            <a:r>
+              <a:rPr lang="es-MX" b="1" dirty="0" smtClean="0"/>
+              <a:t/>
+            </a:r>
+            <a:br>
+              <a:rPr lang="es-MX" b="1" dirty="0" smtClean="0"/>
+            </a:br>
+            <a:r>
+              <a:rPr lang="es-MX" b="1" dirty="0"/>
+              <a:t/>
+            </a:r>
+            <a:br>
+              <a:rPr lang="es-MX" b="1" dirty="0"/>
+            </a:br>
+            <a:r>
+              <a:rPr lang="es-MX" b="1" dirty="0" smtClean="0"/>
+              <a:t/>
+            </a:r>
+            <a:br>
+              <a:rPr lang="es-MX" b="1" dirty="0" smtClean="0"/>
+            </a:br>
+            <a:r>
+              <a:rPr lang="es-MX" b="1" dirty="0"/>
+              <a:t/>
+            </a:r>
+            <a:br>
+              <a:rPr lang="es-MX" b="1" dirty="0"/>
+            </a:br>
+            <a:r>
+              <a:rPr lang="es-MX" b="1" dirty="0" smtClean="0"/>
+              <a:t/>
+            </a:r>
+            <a:br>
+              <a:rPr lang="es-MX" b="1" dirty="0" smtClean="0"/>
+            </a:br>
+            <a:r>
+              <a:rPr lang="es-MX" b="1" dirty="0"/>
+              <a:t/>
+            </a:r>
+            <a:br>
+              <a:rPr lang="es-MX" b="1" dirty="0"/>
+            </a:br>
+            <a:r>
+              <a:rPr lang="es-MX" b="1" dirty="0" smtClean="0"/>
+              <a:t/>
+            </a:r>
+            <a:br>
+              <a:rPr lang="es-MX" b="1" dirty="0" smtClean="0"/>
+            </a:br>
+            <a:r>
+              <a:rPr lang="es-MX" b="1" dirty="0"/>
+              <a:t/>
+            </a:r>
+            <a:br>
+              <a:rPr lang="es-MX" b="1" dirty="0"/>
+            </a:br>
+            <a:r>
+              <a:rPr lang="es-MX" b="1" dirty="0" smtClean="0"/>
+              <a:t/>
+            </a:r>
+            <a:br>
+              <a:rPr lang="es-MX" b="1" dirty="0" smtClean="0"/>
+            </a:br>
+            <a:r>
+              <a:rPr lang="es-MX" b="1" dirty="0"/>
+              <a:t/>
+            </a:r>
+            <a:br>
+              <a:rPr lang="es-MX" b="1" dirty="0"/>
+            </a:br>
+            <a:r>
+              <a:rPr lang="es-MX" b="1" dirty="0" smtClean="0"/>
+              <a:t/>
+            </a:r>
+            <a:br>
+              <a:rPr lang="es-MX" b="1" dirty="0" smtClean="0"/>
+            </a:br>
+            <a:r>
+              <a:rPr lang="es-MX" b="1" dirty="0" smtClean="0"/>
+              <a:t>¿</a:t>
+            </a:r>
+            <a:r>
+              <a:rPr lang="es-MX" b="1" dirty="0"/>
+              <a:t>Cuándo se utiliza?</a:t>
+            </a:r>
+            <a:br>
+              <a:rPr lang="es-MX" b="1" dirty="0"/>
+            </a:br>
+            <a:endParaRPr lang="es-MX" dirty="0"/>
+          </a:p>
+        </p:txBody>
+      </p:sp>
+      <p:sp>
+        <p:nvSpPr>
+          <p:cNvPr id="3" name="Marcador de contenido 2"/>
+          <p:cNvSpPr>
+            <a:spLocks noGrp="1"/>
+          </p:cNvSpPr>
+          <p:nvPr>
+            <p:ph sz="quarter" idx="1"/>
+          </p:nvPr>
+        </p:nvSpPr>
+        <p:spPr/>
+        <p:txBody>
+          <a:bodyPr>
+            <a:normAutofit fontScale="85000" lnSpcReduction="20000"/>
+          </a:bodyPr>
+          <a:lstStyle/>
+          <a:p>
+            <a:r>
+              <a:rPr lang="es-MX" dirty="0" smtClean="0"/>
+              <a:t>Al </a:t>
+            </a:r>
+            <a:r>
+              <a:rPr lang="es-MX" dirty="0"/>
+              <a:t>identificar un producto o servicio para el análisis para mejorar la calidad.</a:t>
+            </a:r>
+          </a:p>
+          <a:p>
+            <a:r>
+              <a:rPr lang="es-MX" dirty="0"/>
+              <a:t>Cuando existe la necesidad de llamar la atención a los problema o causas de una forma sistemática.</a:t>
+            </a:r>
+          </a:p>
+          <a:p>
+            <a:r>
+              <a:rPr lang="es-MX" dirty="0"/>
+              <a:t>Al identificar oportunidades para mejorar</a:t>
+            </a:r>
+          </a:p>
+          <a:p>
+            <a:r>
+              <a:rPr lang="es-MX" dirty="0"/>
+              <a:t>Al analizar las diferentes agrupaciones de datos (</a:t>
+            </a:r>
+            <a:r>
+              <a:rPr lang="es-MX" dirty="0" err="1"/>
+              <a:t>ej</a:t>
+            </a:r>
+            <a:r>
+              <a:rPr lang="es-MX" dirty="0"/>
+              <a:t>: por producto, por segmento, del mercado, área geográfica, etc.)</a:t>
+            </a:r>
+          </a:p>
+          <a:p>
+            <a:r>
+              <a:rPr lang="es-MX" dirty="0"/>
+              <a:t>Al buscar las causas principales de los problemas y establecer la prioridad de las soluciones</a:t>
+            </a:r>
+          </a:p>
+          <a:p>
+            <a:r>
+              <a:rPr lang="es-MX" dirty="0"/>
+              <a:t>Al evaluar los resultados de los </a:t>
+            </a:r>
+            <a:r>
+              <a:rPr lang="es-MX" dirty="0" err="1"/>
+              <a:t>cambos</a:t>
+            </a:r>
+            <a:r>
+              <a:rPr lang="es-MX" dirty="0"/>
+              <a:t> efectuados a un proceso (antes y después)</a:t>
+            </a:r>
+          </a:p>
+          <a:p>
+            <a:r>
+              <a:rPr lang="es-MX" dirty="0"/>
+              <a:t>Cuando los datos puedan clasificarse en categorías</a:t>
+            </a:r>
+          </a:p>
+          <a:p>
+            <a:r>
+              <a:rPr lang="es-MX" dirty="0"/>
+              <a:t>Cuando el rango de cada categoría es importante</a:t>
+            </a:r>
+          </a:p>
+          <a:p>
+            <a:endParaRPr lang="es-MX" dirty="0"/>
+          </a:p>
+        </p:txBody>
+      </p:sp>
+    </p:spTree>
+    <p:extLst>
+      <p:ext uri="{BB962C8B-B14F-4D97-AF65-F5344CB8AC3E}">
+        <p14:creationId xmlns:p14="http://schemas.microsoft.com/office/powerpoint/2010/main" val="151946647"/>
+      </p:ext>
+    </p:extLst>
+  </p:cSld>
+  <p:clrMapOvr>
+    <a:masterClrMapping/>
+  </p:clrMapOvr>
+</p:sld>
+</file>
+
+<file path=ppt/slides/slide8.xml><?xml version="1.0" encoding="utf-8"?>
 <p:sld xmlns:a="http://schemas.openxmlformats.org/drawingml/2006/main" xmlns:r="http://schemas.openxmlformats.org/officeDocument/2006/relationships" xmlns:p="http://schemas.openxmlformats.org/presentationml/2006/main">
   <p:cSld>
     <p:spTree>
@@ -6695,7 +7541,7 @@
 </p:sld>
 </file>
 
-<file path=ppt/slides/slide7.xml><?xml version="1.0" encoding="utf-8"?>
+<file path=ppt/slides/slide9.xml><?xml version="1.0" encoding="utf-8"?>
 <p:sld xmlns:a="http://schemas.openxmlformats.org/drawingml/2006/main" xmlns:r="http://schemas.openxmlformats.org/officeDocument/2006/relationships" xmlns:p="http://schemas.openxmlformats.org/presentationml/2006/main">
   <p:cSld>
     <p:spTree>

</xml_diff>